<commit_message>
Update documentation and add new skill file for hands-on demo
- Enhanced the `Guide.md` with detailed explanations of agents and skills, clarifying their roles and relationships.
- Revised `demo.md` to improve setup instructions and added a new skill file for the React CSS grid game rendering.
- Updated the `.gitignore` to exclude unnecessary skill files, ensuring a cleaner repository.
</commit_message>
<xml_diff>
--- a/docs/hands-on/avalanche-ai-handson-demo.pptx
+++ b/docs/hands-on/avalanche-ai-handson-demo.pptx
@@ -10,12 +10,14 @@
     <p:sldId id="258" r:id="rId4"/>
     <p:sldId id="260" r:id="rId6"/>
     <p:sldId id="261" r:id="rId7"/>
+    <p:sldId id="286" r:id="rId37"/>
     <p:sldId id="262" r:id="rId8"/>
     <p:sldId id="263" r:id="rId9"/>
     <p:sldId id="264" r:id="rId10"/>
     <p:sldId id="265" r:id="rId11"/>
     <p:sldId id="266" r:id="rId12"/>
     <p:sldId id="267" r:id="rId13"/>
+    <p:sldId id="287" r:id="rId38"/>
     <p:sldId id="268" r:id="rId14"/>
     <p:sldId id="269" r:id="rId15"/>
     <p:sldId id="270" r:id="rId16"/>
@@ -13900,7 +13902,7 @@
         <p:spPr>
           <a:xfrm>
             <a:off x="4663440" y="1188720"/>
-            <a:ext cx="4114800" cy="2103120"/>
+            <a:ext cx="4114800" cy="2560320"/>
           </a:xfrm>
           <a:prstGeom prst="roundRect">
             <a:avLst>
@@ -14268,6 +14270,78 @@
                 </a:solidFill>
               </a:rPr>
               <a:t>github.com/CobaltSato/react-grid-game-rendering-skill</a:t>
+            </a:r>
+            <a:endParaRPr lang="en-US" sz="700" dirty="0"/>
+          </a:p>
+        </p:txBody>
+      </p:sp>
+      <p:sp>
+        <p:nvSpPr>
+          <p:cNvPr id="19" name="Text 17"/>
+          <p:cNvSpPr/>
+          <p:nvPr/>
+        </p:nvSpPr>
+        <p:spPr>
+          <a:xfrm>
+            <a:off x="4754880" y="3200400"/>
+            <a:ext cx="1645920" cy="182880"/>
+          </a:xfrm>
+          <a:prstGeom prst="rect">
+            <a:avLst/>
+          </a:prstGeom>
+          <a:noFill/>
+          <a:ln/>
+        </p:spPr>
+        <p:txBody>
+          <a:bodyPr wrap="square" rtlCol="0" anchor="ctr"/>
+          <a:lstStyle/>
+          <a:p>
+            <a:pPr indent="0" marL="0">
+              <a:buNone/>
+            </a:pPr>
+            <a:r>
+              <a:rPr lang="en-US" sz="900" b="1" dirty="0">
+                <a:solidFill>
+                  <a:srgbClr val="F1C40F"/>
+                </a:solidFill>
+              </a:rPr>
+              <a:t>Cursor Directory</a:t>
+            </a:r>
+            <a:endParaRPr lang="en-US" sz="900" dirty="0"/>
+          </a:p>
+        </p:txBody>
+      </p:sp>
+      <p:sp>
+        <p:nvSpPr>
+          <p:cNvPr id="20" name="Text 18"/>
+          <p:cNvSpPr/>
+          <p:nvPr/>
+        </p:nvSpPr>
+        <p:spPr>
+          <a:xfrm>
+            <a:off x="4754880" y="3364992"/>
+            <a:ext cx="3931920" cy="182880"/>
+          </a:xfrm>
+          <a:prstGeom prst="rect">
+            <a:avLst/>
+          </a:prstGeom>
+          <a:noFill/>
+          <a:ln/>
+        </p:spPr>
+        <p:txBody>
+          <a:bodyPr wrap="square" rtlCol="0" anchor="ctr"/>
+          <a:lstStyle/>
+          <a:p>
+            <a:pPr indent="0" marL="0">
+              <a:buNone/>
+            </a:pPr>
+            <a:r>
+              <a:rPr lang="en-US" sz="700" dirty="0">
+                <a:solidFill>
+                  <a:srgbClr val="CCCCCC"/>
+                </a:solidFill>
+              </a:rPr>
+              <a:t>cursor.directory (AI プロンプト・ルール集)</a:t>
             </a:r>
             <a:endParaRPr lang="en-US" sz="700" dirty="0"/>
           </a:p>
@@ -21940,7 +22014,7 @@
                   <a:srgbClr val="16A085"/>
                 </a:solidFill>
               </a:rPr>
-              <a:t>🎮 Phaser.js ゲーム実装例</a:t>
+              <a:t>🎮 Phaser 2D GameDev (Oak Woods Platformer) + Agent Skills</a:t>
             </a:r>
             <a:endParaRPr lang="en-US" sz="1400" dirty="0"/>
           </a:p>
@@ -24456,6 +24530,1282 @@
               <a:t>• ボタン: グラスモーフィズム / ネオン効果</a:t>
             </a:r>
             <a:endParaRPr lang="en-US" sz="900" dirty="0"/>
+          </a:p>
+        </p:txBody>
+      </p:sp>
+    </p:spTree>
+  </p:cSld>
+  <p:clrMapOvr>
+    <a:masterClrMapping/>
+  </p:clrMapOvr>
+</p:sld>
+</file>
+
+<file path=ppt/slides/slide31.xml><?xml version="1.0" encoding="utf-8"?>
+<p:sld xmlns:a="http://schemas.openxmlformats.org/drawingml/2006/main" xmlns:r="http://schemas.openxmlformats.org/officeDocument/2006/relationships" xmlns:p="http://schemas.openxmlformats.org/presentationml/2006/main">
+  <p:cSld name="Slide 31">
+    <p:bg>
+      <p:bgPr>
+        <a:solidFill>
+          <a:srgbClr val="1A1A2E"/>
+        </a:solidFill>
+      </p:bgPr>
+    </p:bg>
+    <p:spTree>
+      <p:nvGrpSpPr>
+        <p:cNvPr id="1" name=""/>
+        <p:cNvGrpSpPr/>
+        <p:nvPr/>
+      </p:nvGrpSpPr>
+      <p:grpSpPr>
+        <a:xfrm>
+          <a:off x="0" y="0"/>
+          <a:ext cx="0" cy="0"/>
+          <a:chOff x="0" y="0"/>
+          <a:chExt cx="0" cy="0"/>
+        </a:xfrm>
+      </p:grpSpPr>
+      <p:sp>
+        <p:nvSpPr>
+          <p:cNvPr id="2" name="Shape 0"/>
+          <p:cNvSpPr/>
+          <p:nvPr/>
+        </p:nvSpPr>
+        <p:spPr>
+          <a:xfrm>
+            <a:off x="0" y="0"/>
+            <a:ext cx="9144000" cy="731520"/>
+          </a:xfrm>
+          <a:prstGeom prst="rect">
+            <a:avLst/>
+          </a:prstGeom>
+          <a:solidFill>
+            <a:srgbClr val="16A085"/>
+          </a:solidFill>
+          <a:ln/>
+        </p:spPr>
+      </p:sp>
+      <p:sp>
+        <p:nvSpPr>
+          <p:cNvPr id="3" name="Shape 1"/>
+          <p:cNvSpPr/>
+          <p:nvPr/>
+        </p:nvSpPr>
+        <p:spPr>
+          <a:xfrm>
+            <a:off x="365760" y="164592"/>
+            <a:ext cx="1097280" cy="411480"/>
+          </a:xfrm>
+          <a:prstGeom prst="roundRect">
+            <a:avLst>
+              <a:gd name="adj" fmla="val 48889"/>
+            </a:avLst>
+          </a:prstGeom>
+          <a:solidFill>
+            <a:srgbClr val="FFFFFF"/>
+          </a:solidFill>
+          <a:ln/>
+        </p:spPr>
+      </p:sp>
+      <p:sp>
+        <p:nvSpPr>
+          <p:cNvPr id="4" name="Text 2"/>
+          <p:cNvSpPr/>
+          <p:nvPr/>
+        </p:nvSpPr>
+        <p:spPr>
+          <a:xfrm>
+            <a:off x="365760" y="164592"/>
+            <a:ext cx="1097280" cy="411480"/>
+          </a:xfrm>
+          <a:prstGeom prst="rect">
+            <a:avLst/>
+          </a:prstGeom>
+          <a:noFill/>
+          <a:ln/>
+        </p:spPr>
+        <p:txBody>
+          <a:bodyPr wrap="square" rtlCol="0" anchor="ctr"/>
+          <a:lstStyle/>
+          <a:p>
+            <a:pPr algn="ctr" indent="0" marL="0">
+              <a:buNone/>
+            </a:pPr>
+            <a:r>
+              <a:rPr lang="en-US" sz="1400" b="1" dirty="0">
+                <a:solidFill>
+                  <a:srgbClr val="16A085"/>
+                </a:solidFill>
+              </a:rPr>
+              <a:t>Phase 0</a:t>
+            </a:r>
+            <a:endParaRPr lang="en-US" sz="1400" dirty="0"/>
+          </a:p>
+        </p:txBody>
+      </p:sp>
+      <p:sp>
+        <p:nvSpPr>
+          <p:cNvPr id="5" name="Text 3"/>
+          <p:cNvSpPr/>
+          <p:nvPr/>
+        </p:nvSpPr>
+        <p:spPr>
+          <a:xfrm>
+            <a:off x="1645920" y="182880"/>
+            <a:ext cx="6400800" cy="457200"/>
+          </a:xfrm>
+          <a:prstGeom prst="rect">
+            <a:avLst/>
+          </a:prstGeom>
+          <a:noFill/>
+          <a:ln/>
+        </p:spPr>
+        <p:txBody>
+          <a:bodyPr wrap="square" rtlCol="0" anchor="ctr"/>
+          <a:lstStyle/>
+          <a:p>
+            <a:pPr indent="0" marL="0">
+              <a:buNone/>
+            </a:pPr>
+            <a:r>
+              <a:rPr lang="en-US" sz="2600" b="1" dirty="0">
+                <a:solidFill>
+                  <a:srgbClr val="FFFFFF"/>
+                </a:solidFill>
+              </a:rPr>
+              <a:t>環境の動作確認</a:t>
+            </a:r>
+            <a:endParaRPr lang="en-US" sz="2600" dirty="0"/>
+          </a:p>
+        </p:txBody>
+      </p:sp>
+      <p:sp>
+        <p:nvSpPr>
+          <p:cNvPr id="6" name="Shape 4"/>
+          <p:cNvSpPr/>
+          <p:nvPr/>
+        </p:nvSpPr>
+        <p:spPr>
+          <a:xfrm>
+            <a:off x="365760" y="914400"/>
+            <a:ext cx="8412480" cy="914400"/>
+          </a:xfrm>
+          <a:prstGeom prst="roundRect">
+            <a:avLst>
+              <a:gd name="adj" fmla="val 8333"/>
+            </a:avLst>
+          </a:prstGeom>
+          <a:solidFill>
+            <a:srgbClr val="2D4A3E"/>
+          </a:solidFill>
+          <a:ln/>
+        </p:spPr>
+      </p:sp>
+      <p:sp>
+        <p:nvSpPr>
+          <p:cNvPr id="7" name="Text 5"/>
+          <p:cNvSpPr/>
+          <p:nvPr/>
+        </p:nvSpPr>
+        <p:spPr>
+          <a:xfrm>
+            <a:off x="457200" y="960120"/>
+            <a:ext cx="8229600" cy="274320"/>
+          </a:xfrm>
+          <a:prstGeom prst="rect">
+            <a:avLst/>
+          </a:prstGeom>
+          <a:noFill/>
+          <a:ln/>
+        </p:spPr>
+        <p:txBody>
+          <a:bodyPr wrap="square" rtlCol="0" anchor="ctr"/>
+          <a:lstStyle/>
+          <a:p>
+            <a:pPr indent="0" marL="0">
+              <a:buNone/>
+            </a:pPr>
+            <a:r>
+              <a:rPr lang="en-US" sz="1400" b="1" dirty="0">
+                <a:solidFill>
+                  <a:srgbClr val="F1C40F"/>
+                </a:solidFill>
+              </a:rPr>
+              <a:t>💡 Codespaces 起動後、環境が正しくセットアップされているか確認</a:t>
+            </a:r>
+            <a:endParaRPr lang="en-US" sz="1400" dirty="0"/>
+          </a:p>
+        </p:txBody>
+      </p:sp>
+      <p:sp>
+        <p:nvSpPr>
+          <p:cNvPr id="8" name="Text 6"/>
+          <p:cNvSpPr/>
+          <p:nvPr/>
+        </p:nvSpPr>
+        <p:spPr>
+          <a:xfrm>
+            <a:off x="457200" y="1280160"/>
+            <a:ext cx="8229600" cy="457200"/>
+          </a:xfrm>
+          <a:prstGeom prst="rect">
+            <a:avLst/>
+          </a:prstGeom>
+          <a:noFill/>
+          <a:ln/>
+        </p:spPr>
+        <p:txBody>
+          <a:bodyPr wrap="square" rtlCol="0" anchor="ctr"/>
+          <a:lstStyle/>
+          <a:p>
+            <a:pPr algn="ctr" indent="0" marL="0">
+              <a:buNone/>
+            </a:pPr>
+            <a:r>
+              <a:rPr lang="en-US" sz="2000" b="1" dirty="0">
+                <a:solidFill>
+                  <a:srgbClr val="16A085"/>
+                </a:solidFill>
+                <a:latin typeface="Courier New"/>
+              </a:rPr>
+              <a:t>npm run dev</a:t>
+            </a:r>
+            <a:endParaRPr lang="en-US" sz="2000" dirty="0"/>
+          </a:p>
+        </p:txBody>
+      </p:sp>
+      <p:sp>
+        <p:nvSpPr>
+          <p:cNvPr id="9" name="Text 7"/>
+          <p:cNvSpPr/>
+          <p:nvPr/>
+        </p:nvSpPr>
+        <p:spPr>
+          <a:xfrm>
+            <a:off x="365760" y="2011680"/>
+            <a:ext cx="8229600" cy="365760"/>
+          </a:xfrm>
+          <a:prstGeom prst="rect">
+            <a:avLst/>
+          </a:prstGeom>
+          <a:noFill/>
+          <a:ln/>
+        </p:spPr>
+        <p:txBody>
+          <a:bodyPr wrap="square" rtlCol="0" anchor="ctr"/>
+          <a:lstStyle/>
+          <a:p>
+            <a:pPr indent="0" marL="0">
+              <a:buNone/>
+            </a:pPr>
+            <a:r>
+              <a:rPr lang="en-US" sz="1600" b="1" dirty="0">
+                <a:solidFill>
+                  <a:srgbClr val="16A085"/>
+                </a:solidFill>
+              </a:rPr>
+              <a:t>確認ポイント</a:t>
+            </a:r>
+            <a:endParaRPr lang="en-US" sz="1600" dirty="0"/>
+          </a:p>
+        </p:txBody>
+      </p:sp>
+      <p:sp>
+        <p:nvSpPr>
+          <p:cNvPr id="10" name="Shape 8"/>
+          <p:cNvSpPr/>
+          <p:nvPr/>
+        </p:nvSpPr>
+        <p:spPr>
+          <a:xfrm>
+            <a:off x="457200" y="2468880"/>
+            <a:ext cx="365760" cy="365760"/>
+          </a:xfrm>
+          <a:prstGeom prst="ellipse">
+            <a:avLst/>
+          </a:prstGeom>
+          <a:solidFill>
+            <a:srgbClr val="16A085"/>
+          </a:solidFill>
+          <a:ln/>
+        </p:spPr>
+      </p:sp>
+      <p:sp>
+        <p:nvSpPr>
+          <p:cNvPr id="11" name="Text 9"/>
+          <p:cNvSpPr/>
+          <p:nvPr/>
+        </p:nvSpPr>
+        <p:spPr>
+          <a:xfrm>
+            <a:off x="457200" y="2468880"/>
+            <a:ext cx="365760" cy="365760"/>
+          </a:xfrm>
+          <a:prstGeom prst="rect">
+            <a:avLst/>
+          </a:prstGeom>
+          <a:noFill/>
+          <a:ln/>
+        </p:spPr>
+        <p:txBody>
+          <a:bodyPr wrap="square" rtlCol="0" anchor="ctr"/>
+          <a:lstStyle/>
+          <a:p>
+            <a:pPr algn="ctr" indent="0" marL="0">
+              <a:buNone/>
+            </a:pPr>
+            <a:r>
+              <a:rPr lang="en-US" sz="1400" b="1" dirty="0">
+                <a:solidFill>
+                  <a:srgbClr val="FFFFFF"/>
+                </a:solidFill>
+              </a:rPr>
+              <a:t>✓</a:t>
+            </a:r>
+            <a:endParaRPr lang="en-US" sz="1400" dirty="0"/>
+          </a:p>
+        </p:txBody>
+      </p:sp>
+      <p:sp>
+        <p:nvSpPr>
+          <p:cNvPr id="12" name="Text 10"/>
+          <p:cNvSpPr/>
+          <p:nvPr/>
+        </p:nvSpPr>
+        <p:spPr>
+          <a:xfrm>
+            <a:off x="914400" y="2468880"/>
+            <a:ext cx="7772400" cy="365760"/>
+          </a:xfrm>
+          <a:prstGeom prst="rect">
+            <a:avLst/>
+          </a:prstGeom>
+          <a:noFill/>
+          <a:ln/>
+        </p:spPr>
+        <p:txBody>
+          <a:bodyPr wrap="square" rtlCol="0" anchor="ctr"/>
+          <a:lstStyle/>
+          <a:p>
+            <a:pPr indent="0" marL="0">
+              <a:buNone/>
+            </a:pPr>
+            <a:r>
+              <a:rPr lang="en-US" sz="1200" dirty="0">
+                <a:solidFill>
+                  <a:srgbClr val="CCCCCC"/>
+                </a:solidFill>
+              </a:rPr>
+              <a:t>ターミナルに Local: http://localhost:3000 と表示されれば OK</a:t>
+            </a:r>
+            <a:endParaRPr lang="en-US" sz="1200" dirty="0"/>
+          </a:p>
+        </p:txBody>
+      </p:sp>
+      <p:sp>
+        <p:nvSpPr>
+          <p:cNvPr id="13" name="Shape 11"/>
+          <p:cNvSpPr/>
+          <p:nvPr/>
+        </p:nvSpPr>
+        <p:spPr>
+          <a:xfrm>
+            <a:off x="457200" y="2971800"/>
+            <a:ext cx="365760" cy="365760"/>
+          </a:xfrm>
+          <a:prstGeom prst="ellipse">
+            <a:avLst/>
+          </a:prstGeom>
+          <a:solidFill>
+            <a:srgbClr val="16A085"/>
+          </a:solidFill>
+          <a:ln/>
+        </p:spPr>
+      </p:sp>
+      <p:sp>
+        <p:nvSpPr>
+          <p:cNvPr id="14" name="Text 12"/>
+          <p:cNvSpPr/>
+          <p:nvPr/>
+        </p:nvSpPr>
+        <p:spPr>
+          <a:xfrm>
+            <a:off x="457200" y="2971800"/>
+            <a:ext cx="365760" cy="365760"/>
+          </a:xfrm>
+          <a:prstGeom prst="rect">
+            <a:avLst/>
+          </a:prstGeom>
+          <a:noFill/>
+          <a:ln/>
+        </p:spPr>
+        <p:txBody>
+          <a:bodyPr wrap="square" rtlCol="0" anchor="ctr"/>
+          <a:lstStyle/>
+          <a:p>
+            <a:pPr algn="ctr" indent="0" marL="0">
+              <a:buNone/>
+            </a:pPr>
+            <a:r>
+              <a:rPr lang="en-US" sz="1400" b="1" dirty="0">
+                <a:solidFill>
+                  <a:srgbClr val="FFFFFF"/>
+                </a:solidFill>
+              </a:rPr>
+              <a:t>✓</a:t>
+            </a:r>
+            <a:endParaRPr lang="en-US" sz="1400" dirty="0"/>
+          </a:p>
+        </p:txBody>
+      </p:sp>
+      <p:sp>
+        <p:nvSpPr>
+          <p:cNvPr id="15" name="Text 13"/>
+          <p:cNvSpPr/>
+          <p:nvPr/>
+        </p:nvSpPr>
+        <p:spPr>
+          <a:xfrm>
+            <a:off x="914400" y="2971800"/>
+            <a:ext cx="7772400" cy="365760"/>
+          </a:xfrm>
+          <a:prstGeom prst="rect">
+            <a:avLst/>
+          </a:prstGeom>
+          <a:noFill/>
+          <a:ln/>
+        </p:spPr>
+        <p:txBody>
+          <a:bodyPr wrap="square" rtlCol="0" anchor="ctr"/>
+          <a:lstStyle/>
+          <a:p>
+            <a:pPr indent="0" marL="0">
+              <a:buNone/>
+            </a:pPr>
+            <a:r>
+              <a:rPr lang="en-US" sz="1200" dirty="0">
+                <a:solidFill>
+                  <a:srgbClr val="CCCCCC"/>
+                </a:solidFill>
+              </a:rPr>
+              <a:t>ポップアップで「Open in Browser」が表示されたらクリック</a:t>
+            </a:r>
+            <a:endParaRPr lang="en-US" sz="1200" dirty="0"/>
+          </a:p>
+        </p:txBody>
+      </p:sp>
+      <p:sp>
+        <p:nvSpPr>
+          <p:cNvPr id="16" name="Shape 14"/>
+          <p:cNvSpPr/>
+          <p:nvPr/>
+        </p:nvSpPr>
+        <p:spPr>
+          <a:xfrm>
+            <a:off x="457200" y="3474720"/>
+            <a:ext cx="365760" cy="365760"/>
+          </a:xfrm>
+          <a:prstGeom prst="ellipse">
+            <a:avLst/>
+          </a:prstGeom>
+          <a:solidFill>
+            <a:srgbClr val="E84142"/>
+          </a:solidFill>
+          <a:ln/>
+        </p:spPr>
+      </p:sp>
+      <p:sp>
+        <p:nvSpPr>
+          <p:cNvPr id="17" name="Text 15"/>
+          <p:cNvSpPr/>
+          <p:nvPr/>
+        </p:nvSpPr>
+        <p:spPr>
+          <a:xfrm>
+            <a:off x="457200" y="3474720"/>
+            <a:ext cx="365760" cy="365760"/>
+          </a:xfrm>
+          <a:prstGeom prst="rect">
+            <a:avLst/>
+          </a:prstGeom>
+          <a:noFill/>
+          <a:ln/>
+        </p:spPr>
+        <p:txBody>
+          <a:bodyPr wrap="square" rtlCol="0" anchor="ctr"/>
+          <a:lstStyle/>
+          <a:p>
+            <a:pPr algn="ctr" indent="0" marL="0">
+              <a:buNone/>
+            </a:pPr>
+            <a:r>
+              <a:rPr lang="en-US" sz="1400" b="1" dirty="0">
+                <a:solidFill>
+                  <a:srgbClr val="FFFFFF"/>
+                </a:solidFill>
+              </a:rPr>
+              <a:t>!</a:t>
+            </a:r>
+            <a:endParaRPr lang="en-US" sz="1400" dirty="0"/>
+          </a:p>
+        </p:txBody>
+      </p:sp>
+      <p:sp>
+        <p:nvSpPr>
+          <p:cNvPr id="18" name="Text 16"/>
+          <p:cNvSpPr/>
+          <p:nvPr/>
+        </p:nvSpPr>
+        <p:spPr>
+          <a:xfrm>
+            <a:off x="914400" y="3474720"/>
+            <a:ext cx="7772400" cy="365760"/>
+          </a:xfrm>
+          <a:prstGeom prst="rect">
+            <a:avLst/>
+          </a:prstGeom>
+          <a:noFill/>
+          <a:ln/>
+        </p:spPr>
+        <p:txBody>
+          <a:bodyPr wrap="square" rtlCol="0" anchor="ctr"/>
+          <a:lstStyle/>
+          <a:p>
+            <a:pPr indent="0" marL="0">
+              <a:buNone/>
+            </a:pPr>
+            <a:r>
+              <a:rPr lang="en-US" sz="1200" dirty="0">
+                <a:solidFill>
+                  <a:srgbClr val="CCCCCC"/>
+                </a:solidFill>
+              </a:rPr>
+              <a:t>問題があれば npm ci を実行して依存関係を再インストール</a:t>
+            </a:r>
+            <a:endParaRPr lang="en-US" sz="1200" dirty="0"/>
+          </a:p>
+        </p:txBody>
+      </p:sp>
+      <p:sp>
+        <p:nvSpPr>
+          <p:cNvPr id="19" name="Shape 17"/>
+          <p:cNvSpPr/>
+          <p:nvPr/>
+        </p:nvSpPr>
+        <p:spPr>
+          <a:xfrm>
+            <a:off x="365760" y="4023360"/>
+            <a:ext cx="8412480" cy="731520"/>
+          </a:xfrm>
+          <a:prstGeom prst="roundRect">
+            <a:avLst>
+              <a:gd name="adj" fmla="val 10000"/>
+            </a:avLst>
+          </a:prstGeom>
+          <a:solidFill>
+            <a:srgbClr val="252540"/>
+          </a:solidFill>
+          <a:ln/>
+        </p:spPr>
+      </p:sp>
+      <p:sp>
+        <p:nvSpPr>
+          <p:cNvPr id="20" name="Text 18"/>
+          <p:cNvSpPr/>
+          <p:nvPr/>
+        </p:nvSpPr>
+        <p:spPr>
+          <a:xfrm>
+            <a:off x="457200" y="4114800"/>
+            <a:ext cx="8229600" cy="548640"/>
+          </a:xfrm>
+          <a:prstGeom prst="rect">
+            <a:avLst/>
+          </a:prstGeom>
+          <a:noFill/>
+          <a:ln/>
+        </p:spPr>
+        <p:txBody>
+          <a:bodyPr wrap="square" rtlCol="0" anchor="ctr"/>
+          <a:lstStyle/>
+          <a:p>
+            <a:pPr algn="ctr" indent="0" marL="0">
+              <a:buNone/>
+            </a:pPr>
+            <a:r>
+              <a:rPr lang="en-US" sz="1100" dirty="0">
+                <a:solidFill>
+                  <a:srgbClr val="F1C40F"/>
+                </a:solidFill>
+              </a:rPr>
+              <a:t>⚡ 起動確認できたら Ctrl+C で停止し、次の手順へ進む</a:t>
+            </a:r>
+            <a:endParaRPr lang="en-US" sz="1100" dirty="0"/>
+          </a:p>
+        </p:txBody>
+      </p:sp>
+    </p:spTree>
+  </p:cSld>
+  <p:clrMapOvr>
+    <a:masterClrMapping/>
+  </p:clrMapOvr>
+</p:sld>
+</file>
+
+<file path=ppt/slides/slide32.xml><?xml version="1.0" encoding="utf-8"?>
+<p:sld xmlns:a="http://schemas.openxmlformats.org/drawingml/2006/main" xmlns:r="http://schemas.openxmlformats.org/officeDocument/2006/relationships" xmlns:p="http://schemas.openxmlformats.org/presentationml/2006/main">
+  <p:cSld name="Slide 32">
+    <p:bg>
+      <p:bgPr>
+        <a:solidFill>
+          <a:srgbClr val="1A1A2E"/>
+        </a:solidFill>
+      </p:bgPr>
+    </p:bg>
+    <p:spTree>
+      <p:nvGrpSpPr>
+        <p:cNvPr id="1" name=""/>
+        <p:cNvGrpSpPr/>
+        <p:nvPr/>
+      </p:nvGrpSpPr>
+      <p:grpSpPr>
+        <a:xfrm>
+          <a:off x="0" y="0"/>
+          <a:ext cx="0" cy="0"/>
+          <a:chOff x="0" y="0"/>
+          <a:chExt cx="0" cy="0"/>
+        </a:xfrm>
+      </p:grpSpPr>
+      <p:sp>
+        <p:nvSpPr>
+          <p:cNvPr id="2" name="Shape 0"/>
+          <p:cNvSpPr/>
+          <p:nvPr/>
+        </p:nvSpPr>
+        <p:spPr>
+          <a:xfrm>
+            <a:off x="0" y="0"/>
+            <a:ext cx="9144000" cy="731520"/>
+          </a:xfrm>
+          <a:prstGeom prst="rect">
+            <a:avLst/>
+          </a:prstGeom>
+          <a:solidFill>
+            <a:srgbClr val="9B59B6"/>
+          </a:solidFill>
+          <a:ln/>
+        </p:spPr>
+      </p:sp>
+      <p:sp>
+        <p:nvSpPr>
+          <p:cNvPr id="3" name="Text 1"/>
+          <p:cNvSpPr/>
+          <p:nvPr/>
+        </p:nvSpPr>
+        <p:spPr>
+          <a:xfrm>
+            <a:off x="365760" y="182880"/>
+            <a:ext cx="8412480" cy="457200"/>
+          </a:xfrm>
+          <a:prstGeom prst="rect">
+            <a:avLst/>
+          </a:prstGeom>
+          <a:noFill/>
+          <a:ln/>
+        </p:spPr>
+        <p:txBody>
+          <a:bodyPr wrap="square" rtlCol="0" anchor="ctr"/>
+          <a:lstStyle/>
+          <a:p>
+            <a:pPr indent="0" marL="0">
+              <a:buNone/>
+            </a:pPr>
+            <a:r>
+              <a:rPr lang="en-US" sz="2400" b="1" dirty="0">
+                <a:solidFill>
+                  <a:srgbClr val="FFFFFF"/>
+                </a:solidFill>
+              </a:rPr>
+              <a:t>💡 補足: エージェント vs スキル（Claude Code）</a:t>
+            </a:r>
+            <a:endParaRPr lang="en-US" sz="2400" dirty="0"/>
+          </a:p>
+        </p:txBody>
+      </p:sp>
+      <p:sp>
+        <p:nvSpPr>
+          <p:cNvPr id="4" name="Shape 2"/>
+          <p:cNvSpPr/>
+          <p:nvPr/>
+        </p:nvSpPr>
+        <p:spPr>
+          <a:xfrm>
+            <a:off x="365760" y="914400"/>
+            <a:ext cx="8412480" cy="640080"/>
+          </a:xfrm>
+          <a:prstGeom prst="roundRect">
+            <a:avLst>
+              <a:gd name="adj" fmla="val 10000"/>
+            </a:avLst>
+          </a:prstGeom>
+          <a:solidFill>
+            <a:srgbClr val="2D4A3E"/>
+          </a:solidFill>
+          <a:ln/>
+        </p:spPr>
+      </p:sp>
+      <p:sp>
+        <p:nvSpPr>
+          <p:cNvPr id="5" name="Text 3"/>
+          <p:cNvSpPr/>
+          <p:nvPr/>
+        </p:nvSpPr>
+        <p:spPr>
+          <a:xfrm>
+            <a:off x="457200" y="1005840"/>
+            <a:ext cx="8229600" cy="457200"/>
+          </a:xfrm>
+          <a:prstGeom prst="rect">
+            <a:avLst/>
+          </a:prstGeom>
+          <a:noFill/>
+          <a:ln/>
+        </p:spPr>
+        <p:txBody>
+          <a:bodyPr wrap="square" rtlCol="0" anchor="ctr"/>
+          <a:lstStyle/>
+          <a:p>
+            <a:pPr algn="ctr" indent="0" marL="0">
+              <a:buNone/>
+            </a:pPr>
+            <a:r>
+              <a:rPr lang="en-US" sz="1200" dirty="0">
+                <a:solidFill>
+                  <a:srgbClr val="FFFFFF"/>
+                </a:solidFill>
+              </a:rPr>
+              <a:t>Claude Code では「エージェント」と「スキル」は異なる概念です</a:t>
+            </a:r>
+            <a:endParaRPr lang="en-US" sz="1200" dirty="0"/>
+          </a:p>
+        </p:txBody>
+      </p:sp>
+      <p:sp>
+        <p:nvSpPr>
+          <p:cNvPr id="6" name="Shape 4"/>
+          <p:cNvSpPr/>
+          <p:nvPr/>
+        </p:nvSpPr>
+        <p:spPr>
+          <a:xfrm>
+            <a:off x="365760" y="1737360"/>
+            <a:ext cx="4114800" cy="1463040"/>
+          </a:xfrm>
+          <a:prstGeom prst="roundRect">
+            <a:avLst>
+              <a:gd name="adj" fmla="val 5556"/>
+            </a:avLst>
+          </a:prstGeom>
+          <a:solidFill>
+            <a:srgbClr val="16A085"/>
+          </a:solidFill>
+          <a:ln/>
+        </p:spPr>
+      </p:sp>
+      <p:sp>
+        <p:nvSpPr>
+          <p:cNvPr id="7" name="Text 5"/>
+          <p:cNvSpPr/>
+          <p:nvPr/>
+        </p:nvSpPr>
+        <p:spPr>
+          <a:xfrm>
+            <a:off x="365760" y="1828800"/>
+            <a:ext cx="4114800" cy="365760"/>
+          </a:xfrm>
+          <a:prstGeom prst="rect">
+            <a:avLst/>
+          </a:prstGeom>
+          <a:noFill/>
+          <a:ln/>
+        </p:spPr>
+        <p:txBody>
+          <a:bodyPr wrap="square" rtlCol="0" anchor="ctr"/>
+          <a:lstStyle/>
+          <a:p>
+            <a:pPr algn="ctr" indent="0" marL="0">
+              <a:buNone/>
+            </a:pPr>
+            <a:r>
+              <a:rPr lang="en-US" sz="1600" b="1" dirty="0">
+                <a:solidFill>
+                  <a:srgbClr val="FFFFFF"/>
+                </a:solidFill>
+              </a:rPr>
+              <a:t>🎯 スキル (Skills)</a:t>
+            </a:r>
+            <a:endParaRPr lang="en-US" sz="1600" dirty="0"/>
+          </a:p>
+        </p:txBody>
+      </p:sp>
+      <p:sp>
+        <p:nvSpPr>
+          <p:cNvPr id="8" name="Text 6"/>
+          <p:cNvSpPr/>
+          <p:nvPr/>
+        </p:nvSpPr>
+        <p:spPr>
+          <a:xfrm>
+            <a:off x="457200" y="2194560"/>
+            <a:ext cx="3931920" cy="914400"/>
+          </a:xfrm>
+          <a:prstGeom prst="rect">
+            <a:avLst/>
+          </a:prstGeom>
+          <a:noFill/>
+          <a:ln/>
+        </p:spPr>
+        <p:txBody>
+          <a:bodyPr wrap="square" rtlCol="0" anchor="t"/>
+          <a:lstStyle/>
+          <a:p>
+            <a:pPr indent="0" marL="0">
+              <a:buNone/>
+            </a:pPr>
+            <a:r>
+              <a:rPr lang="en-US" sz="1000" dirty="0">
+                <a:solidFill>
+                  <a:srgbClr val="FFFFFF"/>
+                </a:solidFill>
+              </a:rPr>
+              <a:t>• /plan, /tdd などスラッシュコマンド</a:t>
+            </a:r>
+            <a:endParaRPr lang="en-US" sz="1000" dirty="0"/>
+          </a:p>
+          <a:p>
+            <a:pPr indent="0" marL="0">
+              <a:buNone/>
+            </a:pPr>
+            <a:r>
+              <a:rPr lang="en-US" sz="1000" dirty="0">
+                <a:solidFill>
+                  <a:srgbClr val="FFFFFF"/>
+                </a:solidFill>
+              </a:rPr>
+              <a:t>• メインの Claude が実行</a:t>
+            </a:r>
+            <a:endParaRPr lang="en-US" sz="1000" dirty="0"/>
+          </a:p>
+          <a:p>
+            <a:pPr indent="0" marL="0">
+              <a:buNone/>
+            </a:pPr>
+            <a:r>
+              <a:rPr lang="en-US" sz="1000" dirty="0">
+                <a:solidFill>
+                  <a:srgbClr val="FFFFFF"/>
+                </a:solidFill>
+              </a:rPr>
+              <a:t>• ユーザーが明示的に呼び出す</a:t>
+            </a:r>
+            <a:endParaRPr lang="en-US" sz="1000" dirty="0"/>
+          </a:p>
+          <a:p>
+            <a:pPr indent="0" marL="0">
+              <a:buNone/>
+            </a:pPr>
+            <a:r>
+              <a:rPr lang="en-US" sz="1000" b="1" dirty="0">
+                <a:solidFill>
+                  <a:srgbClr val="F1C40F"/>
+                </a:solidFill>
+              </a:rPr>
+              <a:t>→ 「手順書」のイメージ</a:t>
+            </a:r>
+            <a:endParaRPr lang="en-US" sz="1000" dirty="0"/>
+          </a:p>
+        </p:txBody>
+      </p:sp>
+      <p:sp>
+        <p:nvSpPr>
+          <p:cNvPr id="9" name="Shape 7"/>
+          <p:cNvSpPr/>
+          <p:nvPr/>
+        </p:nvSpPr>
+        <p:spPr>
+          <a:xfrm>
+            <a:off x="4663440" y="1737360"/>
+            <a:ext cx="4114800" cy="1463040"/>
+          </a:xfrm>
+          <a:prstGeom prst="roundRect">
+            <a:avLst>
+              <a:gd name="adj" fmla="val 5556"/>
+            </a:avLst>
+          </a:prstGeom>
+          <a:solidFill>
+            <a:srgbClr val="E84142"/>
+          </a:solidFill>
+          <a:ln/>
+        </p:spPr>
+      </p:sp>
+      <p:sp>
+        <p:nvSpPr>
+          <p:cNvPr id="10" name="Text 8"/>
+          <p:cNvSpPr/>
+          <p:nvPr/>
+        </p:nvSpPr>
+        <p:spPr>
+          <a:xfrm>
+            <a:off x="4663440" y="1828800"/>
+            <a:ext cx="4114800" cy="365760"/>
+          </a:xfrm>
+          <a:prstGeom prst="rect">
+            <a:avLst/>
+          </a:prstGeom>
+          <a:noFill/>
+          <a:ln/>
+        </p:spPr>
+        <p:txBody>
+          <a:bodyPr wrap="square" rtlCol="0" anchor="ctr"/>
+          <a:lstStyle/>
+          <a:p>
+            <a:pPr algn="ctr" indent="0" marL="0">
+              <a:buNone/>
+            </a:pPr>
+            <a:r>
+              <a:rPr lang="en-US" sz="1600" b="1" dirty="0">
+                <a:solidFill>
+                  <a:srgbClr val="FFFFFF"/>
+                </a:solidFill>
+              </a:rPr>
+              <a:t>🤖 エージェント (Agents)</a:t>
+            </a:r>
+            <a:endParaRPr lang="en-US" sz="1600" dirty="0"/>
+          </a:p>
+        </p:txBody>
+      </p:sp>
+      <p:sp>
+        <p:nvSpPr>
+          <p:cNvPr id="11" name="Text 9"/>
+          <p:cNvSpPr/>
+          <p:nvPr/>
+        </p:nvSpPr>
+        <p:spPr>
+          <a:xfrm>
+            <a:off x="4754880" y="2194560"/>
+            <a:ext cx="3931920" cy="914400"/>
+          </a:xfrm>
+          <a:prstGeom prst="rect">
+            <a:avLst/>
+          </a:prstGeom>
+          <a:noFill/>
+          <a:ln/>
+        </p:spPr>
+        <p:txBody>
+          <a:bodyPr wrap="square" rtlCol="0" anchor="t"/>
+          <a:lstStyle/>
+          <a:p>
+            <a:pPr indent="0" marL="0">
+              <a:buNone/>
+            </a:pPr>
+            <a:r>
+              <a:rPr lang="en-US" sz="1000" dirty="0">
+                <a:solidFill>
+                  <a:srgbClr val="FFFFFF"/>
+                </a:solidFill>
+              </a:rPr>
+              <a:t>• Task ツールで自動起動</a:t>
+            </a:r>
+            <a:endParaRPr lang="en-US" sz="1000" dirty="0"/>
+          </a:p>
+          <a:p>
+            <a:pPr indent="0" marL="0">
+              <a:buNone/>
+            </a:pPr>
+            <a:r>
+              <a:rPr lang="en-US" sz="1000" dirty="0">
+                <a:solidFill>
+                  <a:srgbClr val="FFFFFF"/>
+                </a:solidFill>
+              </a:rPr>
+              <a:t>• 独立したサブプロセス</a:t>
+            </a:r>
+            <a:endParaRPr lang="en-US" sz="1000" dirty="0"/>
+          </a:p>
+          <a:p>
+            <a:pPr indent="0" marL="0">
+              <a:buNone/>
+            </a:pPr>
+            <a:r>
+              <a:rPr lang="en-US" sz="1000" dirty="0">
+                <a:solidFill>
+                  <a:srgbClr val="FFFFFF"/>
+                </a:solidFill>
+              </a:rPr>
+              <a:t>• Claude が状況に応じて起動</a:t>
+            </a:r>
+            <a:endParaRPr lang="en-US" sz="1000" dirty="0"/>
+          </a:p>
+          <a:p>
+            <a:pPr indent="0" marL="0">
+              <a:buNone/>
+            </a:pPr>
+            <a:r>
+              <a:rPr lang="en-US" sz="1000" b="1" dirty="0">
+                <a:solidFill>
+                  <a:srgbClr val="F1C40F"/>
+                </a:solidFill>
+              </a:rPr>
+              <a:t>→ 「専門家チーム」のイメージ</a:t>
+            </a:r>
+            <a:endParaRPr lang="en-US" sz="1000" dirty="0"/>
+          </a:p>
+        </p:txBody>
+      </p:sp>
+      <p:sp>
+        <p:nvSpPr>
+          <p:cNvPr id="12" name="Text 10"/>
+          <p:cNvSpPr/>
+          <p:nvPr/>
+        </p:nvSpPr>
+        <p:spPr>
+          <a:xfrm>
+            <a:off x="365760" y="3383280"/>
+            <a:ext cx="8412480" cy="365760"/>
+          </a:xfrm>
+          <a:prstGeom prst="rect">
+            <a:avLst/>
+          </a:prstGeom>
+          <a:noFill/>
+          <a:ln/>
+        </p:spPr>
+        <p:txBody>
+          <a:bodyPr wrap="square" rtlCol="0" anchor="ctr"/>
+          <a:lstStyle/>
+          <a:p>
+            <a:pPr indent="0" marL="0">
+              <a:buNone/>
+            </a:pPr>
+            <a:r>
+              <a:rPr lang="en-US" sz="1200" b="1" dirty="0">
+                <a:solidFill>
+                  <a:srgbClr val="16A085"/>
+                </a:solidFill>
+              </a:rPr>
+              <a:t>スキルの例</a:t>
+            </a:r>
+            <a:endParaRPr lang="en-US" sz="1200" dirty="0"/>
+          </a:p>
+        </p:txBody>
+      </p:sp>
+      <p:sp>
+        <p:nvSpPr>
+          <p:cNvPr id="13" name="Shape 11"/>
+          <p:cNvSpPr/>
+          <p:nvPr/>
+        </p:nvSpPr>
+        <p:spPr>
+          <a:xfrm>
+            <a:off x="365760" y="3749040"/>
+            <a:ext cx="4114800" cy="640080"/>
+          </a:xfrm>
+          <a:prstGeom prst="roundRect">
+            <a:avLst>
+              <a:gd name="adj" fmla="val 11429"/>
+            </a:avLst>
+          </a:prstGeom>
+          <a:solidFill>
+            <a:srgbClr val="252540"/>
+          </a:solidFill>
+          <a:ln/>
+        </p:spPr>
+      </p:sp>
+      <p:sp>
+        <p:nvSpPr>
+          <p:cNvPr id="14" name="Text 12"/>
+          <p:cNvSpPr/>
+          <p:nvPr/>
+        </p:nvSpPr>
+        <p:spPr>
+          <a:xfrm>
+            <a:off x="457200" y="3840480"/>
+            <a:ext cx="3931920" cy="457200"/>
+          </a:xfrm>
+          <a:prstGeom prst="rect">
+            <a:avLst/>
+          </a:prstGeom>
+          <a:noFill/>
+          <a:ln/>
+        </p:spPr>
+        <p:txBody>
+          <a:bodyPr wrap="square" rtlCol="0" anchor="ctr"/>
+          <a:lstStyle/>
+          <a:p>
+            <a:pPr indent="0" marL="0">
+              <a:buNone/>
+            </a:pPr>
+            <a:r>
+              <a:rPr lang="en-US" sz="1000" dirty="0">
+                <a:solidFill>
+                  <a:srgbClr val="CCCCCC"/>
+                </a:solidFill>
+                <a:latin typeface="Courier New"/>
+              </a:rPr>
+              <a:t>/plan  /tdd  /code-review</a:t>
+            </a:r>
+            <a:endParaRPr lang="en-US" sz="1000" dirty="0"/>
+          </a:p>
+        </p:txBody>
+      </p:sp>
+      <p:sp>
+        <p:nvSpPr>
+          <p:cNvPr id="15" name="Text 13"/>
+          <p:cNvSpPr/>
+          <p:nvPr/>
+        </p:nvSpPr>
+        <p:spPr>
+          <a:xfrm>
+            <a:off x="4663440" y="3383280"/>
+            <a:ext cx="4114800" cy="365760"/>
+          </a:xfrm>
+          <a:prstGeom prst="rect">
+            <a:avLst/>
+          </a:prstGeom>
+          <a:noFill/>
+          <a:ln/>
+        </p:spPr>
+        <p:txBody>
+          <a:bodyPr wrap="square" rtlCol="0" anchor="ctr"/>
+          <a:lstStyle/>
+          <a:p>
+            <a:pPr indent="0" marL="0">
+              <a:buNone/>
+            </a:pPr>
+            <a:r>
+              <a:rPr lang="en-US" sz="1200" b="1" dirty="0">
+                <a:solidFill>
+                  <a:srgbClr val="E84142"/>
+                </a:solidFill>
+              </a:rPr>
+              <a:t>エージェントの例</a:t>
+            </a:r>
+            <a:endParaRPr lang="en-US" sz="1200" dirty="0"/>
+          </a:p>
+        </p:txBody>
+      </p:sp>
+      <p:sp>
+        <p:nvSpPr>
+          <p:cNvPr id="16" name="Shape 14"/>
+          <p:cNvSpPr/>
+          <p:nvPr/>
+        </p:nvSpPr>
+        <p:spPr>
+          <a:xfrm>
+            <a:off x="4663440" y="3749040"/>
+            <a:ext cx="4114800" cy="640080"/>
+          </a:xfrm>
+          <a:prstGeom prst="roundRect">
+            <a:avLst>
+              <a:gd name="adj" fmla="val 11429"/>
+            </a:avLst>
+          </a:prstGeom>
+          <a:solidFill>
+            <a:srgbClr val="252540"/>
+          </a:solidFill>
+          <a:ln/>
+        </p:spPr>
+      </p:sp>
+      <p:sp>
+        <p:nvSpPr>
+          <p:cNvPr id="17" name="Text 15"/>
+          <p:cNvSpPr/>
+          <p:nvPr/>
+        </p:nvSpPr>
+        <p:spPr>
+          <a:xfrm>
+            <a:off x="4754880" y="3840480"/>
+            <a:ext cx="3931920" cy="457200"/>
+          </a:xfrm>
+          <a:prstGeom prst="rect">
+            <a:avLst/>
+          </a:prstGeom>
+          <a:noFill/>
+          <a:ln/>
+        </p:spPr>
+        <p:txBody>
+          <a:bodyPr wrap="square" rtlCol="0" anchor="ctr"/>
+          <a:lstStyle/>
+          <a:p>
+            <a:pPr indent="0" marL="0">
+              <a:buNone/>
+            </a:pPr>
+            <a:r>
+              <a:rPr lang="en-US" sz="1000" dirty="0">
+                <a:solidFill>
+                  <a:srgbClr val="CCCCCC"/>
+                </a:solidFill>
+              </a:rPr>
+              <a:t>planner  code-reviewer  build-error-resolver</a:t>
+            </a:r>
+            <a:endParaRPr lang="en-US" sz="1000" dirty="0"/>
+          </a:p>
+        </p:txBody>
+      </p:sp>
+      <p:sp>
+        <p:nvSpPr>
+          <p:cNvPr id="18" name="Shape 16"/>
+          <p:cNvSpPr/>
+          <p:nvPr/>
+        </p:nvSpPr>
+        <p:spPr>
+          <a:xfrm>
+            <a:off x="365760" y="4572000"/>
+            <a:ext cx="8412480" cy="365760"/>
+          </a:xfrm>
+          <a:prstGeom prst="roundRect">
+            <a:avLst>
+              <a:gd name="adj" fmla="val 20000"/>
+            </a:avLst>
+          </a:prstGeom>
+          <a:solidFill>
+            <a:srgbClr val="9B59B6"/>
+          </a:solidFill>
+          <a:ln/>
+        </p:spPr>
+      </p:sp>
+      <p:sp>
+        <p:nvSpPr>
+          <p:cNvPr id="19" name="Text 17"/>
+          <p:cNvSpPr/>
+          <p:nvPr/>
+        </p:nvSpPr>
+        <p:spPr>
+          <a:xfrm>
+            <a:off x="457200" y="4617720"/>
+            <a:ext cx="8229600" cy="274320"/>
+          </a:xfrm>
+          <a:prstGeom prst="rect">
+            <a:avLst/>
+          </a:prstGeom>
+          <a:noFill/>
+          <a:ln/>
+        </p:spPr>
+        <p:txBody>
+          <a:bodyPr wrap="square" rtlCol="0" anchor="ctr"/>
+          <a:lstStyle/>
+          <a:p>
+            <a:pPr algn="ctr" indent="0" marL="0">
+              <a:buNone/>
+            </a:pPr>
+            <a:r>
+              <a:rPr lang="en-US" sz="1100" b="1" dirty="0">
+                <a:solidFill>
+                  <a:srgbClr val="FFFFFF"/>
+                </a:solidFill>
+              </a:rPr>
+              <a:t>📝 Gemini CLI では両方「スキル」として扱われます</a:t>
+            </a:r>
+            <a:endParaRPr lang="en-US" sz="1100" dirty="0"/>
           </a:p>
         </p:txBody>
       </p:sp>

</xml_diff>

<commit_message>
Enhance hands-on demo documentation and add speaker notes
- Updated `GEMINI.md` with new hard rules regarding contract design and usage of `msg.sender`.
- Expanded `demo.md` to include additional resource links, video tutorials, and detailed demo steps for the Avalanche + AI hands-on project.
- Introduced `hands-on.md` and `speaker-notes.md` files to provide comprehensive guidance and presentation notes for the demo, ensuring clarity and structure for participants.
</commit_message>
<xml_diff>
--- a/docs/hands-on/avalanche-ai-handson-demo.pptx
+++ b/docs/hands-on/avalanche-ai-handson-demo.pptx
@@ -7161,8 +7161,9 @@
                 <a:latin typeface="Courier New" pitchFamily="34" charset="0"/>
                 <a:ea typeface="Courier New" pitchFamily="34" charset="-122"/>
                 <a:cs typeface="Courier New" pitchFamily="34" charset="-120"/>
-              </a:rPr>
-              <a:t>VoltAgent/awesome-agent-skills</a:t>
+                <a:hlinkClick r:id="rId3"/>
+              </a:rPr>
+              <a:t>https://github.com/VoltAgent/awesome-agent-skills</a:t>
             </a:r>
             <a:endParaRPr lang="en-US" sz="900" dirty="0"/>
           </a:p>
@@ -7316,8 +7317,9 @@
                 <a:latin typeface="Courier New" pitchFamily="34" charset="0"/>
                 <a:ea typeface="Courier New" pitchFamily="34" charset="-122"/>
                 <a:cs typeface="Courier New" pitchFamily="34" charset="-120"/>
-              </a:rPr>
-              <a:t>sickn33/antigravity-awesome-skills</a:t>
+                <a:hlinkClick r:id="rId4"/>
+              </a:rPr>
+              <a:t>https://github.com/sickn33/antigravity-awesome-skills</a:t>
             </a:r>
             <a:endParaRPr lang="en-US" sz="900" dirty="0"/>
           </a:p>
@@ -7504,6 +7506,7 @@
                 <a:solidFill>
                   <a:srgbClr val="DA7756"/>
                 </a:solidFill>
+                <a:hlinkClick r:id="rId5"/>
               </a:rPr>
               <a:t>https://geminicli.com/extensions/</a:t>
             </a:r>
@@ -7767,8 +7770,9 @@
                 <a:latin typeface="Courier New" pitchFamily="34" charset="0"/>
                 <a:ea typeface="Courier New" pitchFamily="34" charset="-122"/>
                 <a:cs typeface="Courier New" pitchFamily="34" charset="-120"/>
-              </a:rPr>
-              <a:t>anthropic-agent-skills</a:t>
+                <a:hlinkClick r:id="rId6"/>
+              </a:rPr>
+              <a:t>https://github.com/anthropics/claude-code/tree/main/plugins</a:t>
             </a:r>
             <a:endParaRPr lang="en-US" sz="900" dirty="0"/>
           </a:p>
@@ -7864,8 +7868,9 @@
                 <a:latin typeface="Courier New" pitchFamily="34" charset="0"/>
                 <a:ea typeface="Courier New" pitchFamily="34" charset="-122"/>
                 <a:cs typeface="Courier New" pitchFamily="34" charset="-120"/>
-              </a:rPr>
-              <a:t>buildatscale-tv/gemini-skills</a:t>
+                <a:hlinkClick r:id="rId7"/>
+              </a:rPr>
+              <a:t>https://github.com/buildatscale-tv/gemini-skills</a:t>
             </a:r>
             <a:endParaRPr lang="en-US" sz="900" dirty="0"/>
           </a:p>
@@ -7997,6 +8002,7 @@
                 <a:latin typeface="Courier New" pitchFamily="34" charset="0"/>
                 <a:ea typeface="Courier New" pitchFamily="34" charset="-122"/>
                 <a:cs typeface="Courier New" pitchFamily="34" charset="-120"/>
+                <a:hlinkClick r:id="rId8"/>
               </a:rPr>
               <a:t>gemini extensions install https://github.com/ankitchiplunkar/frontend-design</a:t>
             </a:r>
@@ -8179,8 +8185,9 @@
                 <a:solidFill>
                   <a:srgbClr val="16A085"/>
                 </a:solidFill>
-              </a:rPr>
-              <a:t>Step 1: ターミナルで実行（Gemini CLI の外で）</a:t>
+                <a:hlinkClick r:id="rId3"/>
+              </a:rPr>
+              <a:t>Step 1: スキルファイルをダウンロード → https://github.com/CobaltSato/react-grid-game-rendering-skill</a:t>
             </a:r>
             <a:endParaRPr lang="en-US" sz="1200" dirty="0"/>
           </a:p>
@@ -8241,14 +8248,8 @@
                 <a:ea typeface="Courier New" pitchFamily="34" charset="-122"/>
                 <a:cs typeface="Courier New" pitchFamily="34" charset="-120"/>
               </a:rPr>
-              <a:t># Git リポジトリ、ローカルディレクトリ、.skill ファイルからインストール可能</a:t>
-            </a:r>
-            <a:endParaRPr lang="en-US" sz="800" dirty="0"/>
-          </a:p>
-          <a:p>
-            <a:pPr indent="0" marL="0">
-              <a:buNone/>
-            </a:pPr>
+              <a:t># ダウンロードしたファイルをプロジェクトルートに配置</a:t>
+            </a:r>
             <a:endParaRPr lang="en-US" sz="800" dirty="0"/>
           </a:p>
           <a:p>
@@ -8264,8 +8265,14 @@
                 <a:ea typeface="Courier New" pitchFamily="34" charset="-122"/>
                 <a:cs typeface="Courier New" pitchFamily="34" charset="-120"/>
               </a:rPr>
-              <a:t># グリッドゲームスキル</a:t>
-            </a:r>
+              <a:t>mv ./docs/hands-on/react-css-grid-game-rendering.skill .</a:t>
+            </a:r>
+            <a:endParaRPr lang="en-US" sz="800" dirty="0"/>
+          </a:p>
+          <a:p>
+            <a:pPr indent="0" marL="0">
+              <a:buNone/>
+            </a:pPr>
             <a:endParaRPr lang="en-US" sz="800" dirty="0"/>
           </a:p>
           <a:p>
@@ -8281,7 +8288,24 @@
                 <a:ea typeface="Courier New" pitchFamily="34" charset="-122"/>
                 <a:cs typeface="Courier New" pitchFamily="34" charset="-120"/>
               </a:rPr>
-              <a:t>gemini skills install https://github.com/CobaltSato/react-grid-game-rendering-skill/blob/main/react-css-grid-game-rendering.skill --scope workspace</a:t>
+              <a:t># スキルをインストール</a:t>
+            </a:r>
+            <a:endParaRPr lang="en-US" sz="800" dirty="0"/>
+          </a:p>
+          <a:p>
+            <a:pPr indent="0" marL="0">
+              <a:buNone/>
+            </a:pPr>
+            <a:r>
+              <a:rPr lang="en-US" sz="800" dirty="0">
+                <a:solidFill>
+                  <a:srgbClr val="88FF88"/>
+                </a:solidFill>
+                <a:latin typeface="Courier New" pitchFamily="34" charset="0"/>
+                <a:ea typeface="Courier New" pitchFamily="34" charset="-122"/>
+                <a:cs typeface="Courier New" pitchFamily="34" charset="-120"/>
+              </a:rPr>
+              <a:t>gemini skills install ./react-css-grid-game-rendering.skill --scope workspace</a:t>
             </a:r>
             <a:endParaRPr lang="en-US" sz="800" dirty="0"/>
           </a:p>
@@ -8365,6 +8389,23 @@
         <p:txBody>
           <a:bodyPr wrap="square" rtlCol="0" anchor="ctr"/>
           <a:lstStyle/>
+          <a:p>
+            <a:pPr indent="0" marL="0">
+              <a:buNone/>
+            </a:pPr>
+            <a:r>
+              <a:rPr lang="en-US" sz="1000" dirty="0">
+                <a:solidFill>
+                  <a:srgbClr val="88FF88"/>
+                </a:solidFill>
+                <a:latin typeface="Courier New" pitchFamily="34" charset="0"/>
+                <a:ea typeface="Courier New" pitchFamily="34" charset="-122"/>
+                <a:cs typeface="Courier New" pitchFamily="34" charset="-120"/>
+              </a:rPr>
+              <a:t>gemini            # CLI を再起動</a:t>
+            </a:r>
+            <a:endParaRPr lang="en-US" sz="1000" dirty="0"/>
+          </a:p>
           <a:p>
             <a:pPr indent="0" marL="0">
               <a:buNone/>
@@ -9759,6 +9800,7 @@
                 <a:solidFill>
                   <a:srgbClr val="CCCCCC"/>
                 </a:solidFill>
+                <a:hlinkClick r:id="rId3"/>
               </a:rPr>
               <a:t>https://build.avax.network/</a:t>
             </a:r>
@@ -9923,6 +9965,7 @@
                 <a:solidFill>
                   <a:srgbClr val="CCCCCC"/>
                 </a:solidFill>
+                <a:hlinkClick r:id="rId4"/>
               </a:rPr>
               <a:t>https://remix.ethereum.org</a:t>
             </a:r>
@@ -14315,6 +14358,7 @@
                 <a:solidFill>
                   <a:srgbClr val="CCCCCC"/>
                 </a:solidFill>
+                <a:hlinkClick r:id="rId3"/>
               </a:rPr>
               <a:t>https://core.app/download</a:t>
             </a:r>
@@ -14387,6 +14431,7 @@
                 <a:solidFill>
                   <a:srgbClr val="CCCCCC"/>
                 </a:solidFill>
+                <a:hlinkClick r:id="rId4"/>
               </a:rPr>
               <a:t>https://build.avax.network/console/primary-network/faucet</a:t>
             </a:r>
@@ -14459,6 +14504,7 @@
                 <a:solidFill>
                   <a:srgbClr val="CCCCCC"/>
                 </a:solidFill>
+                <a:hlinkClick r:id="rId5"/>
               </a:rPr>
               <a:t>https://remix.ethereum.org</a:t>
             </a:r>
@@ -14531,6 +14577,7 @@
                 <a:solidFill>
                   <a:srgbClr val="CCCCCC"/>
                 </a:solidFill>
+                <a:hlinkClick r:id="rId6"/>
               </a:rPr>
               <a:t>https://github.com/google-gemini/gemini-cli</a:t>
             </a:r>
@@ -14603,6 +14650,7 @@
                 <a:solidFill>
                   <a:srgbClr val="CCCCCC"/>
                 </a:solidFill>
+                <a:hlinkClick r:id="rId7"/>
               </a:rPr>
               <a:t>https://github.com/CobaltSato/react-grid-game-rendering-skill</a:t>
             </a:r>
@@ -14675,6 +14723,7 @@
                 <a:solidFill>
                   <a:srgbClr val="CCCCCC"/>
                 </a:solidFill>
+                <a:hlinkClick r:id="rId8"/>
               </a:rPr>
               <a:t>https://cursor.directory (AI プロンプト・ルール集)</a:t>
             </a:r>
@@ -23013,6 +23062,7 @@
                 <a:solidFill>
                   <a:srgbClr val="E84142"/>
                 </a:solidFill>
+                <a:hlinkClick r:id="rId3"/>
               </a:rPr>
               <a:t>📎 https://geminicli.com/extensions/</a:t>
             </a:r>
@@ -23179,6 +23229,7 @@
                 <a:solidFill>
                   <a:srgbClr val="E84142"/>
                 </a:solidFill>
+                <a:hlinkClick r:id="rId4"/>
               </a:rPr>
               <a:t>📁 https://github.com/affaan-m/everything-claude-code</a:t>
             </a:r>
@@ -23215,6 +23266,7 @@
                 <a:solidFill>
                   <a:srgbClr val="3498DB"/>
                 </a:solidFill>
+                <a:hlinkClick r:id="rId5"/>
               </a:rPr>
               <a:t>📝 https://zenn.dev/ttks/articles/a54c7520f827be</a:t>
             </a:r>
@@ -23345,6 +23397,7 @@
                 <a:solidFill>
                   <a:srgbClr val="E84142"/>
                 </a:solidFill>
+                <a:hlinkClick r:id="rId6"/>
               </a:rPr>
               <a:t>📺 https://youtube.com/watch?v=QPZCMd5REP8</a:t>
             </a:r>
@@ -23381,6 +23434,7 @@
                 <a:solidFill>
                   <a:srgbClr val="E84142"/>
                 </a:solidFill>
+                <a:hlinkClick r:id="rId7"/>
               </a:rPr>
               <a:t>📁 https://github.com/chongdashu/phaserjs-oakwoods</a:t>
             </a:r>
@@ -23713,6 +23767,7 @@
                 <a:solidFill>
                   <a:srgbClr val="CCCCCC"/>
                 </a:solidFill>
+                <a:hlinkClick r:id="rId8"/>
               </a:rPr>
               <a:t>https://github.com/anthropics/claude-code/tree/main/plugins</a:t>
             </a:r>
@@ -23807,6 +23862,7 @@
                 <a:solidFill>
                   <a:srgbClr val="CCCCCC"/>
                 </a:solidFill>
+                <a:hlinkClick r:id="rId9"/>
               </a:rPr>
               <a:t>https://cursor.directory/ (Solidity, React 等のベストプラクティス)</a:t>
             </a:r>
@@ -25249,7 +25305,7 @@
                 </a:solidFill>
                 <a:latin typeface="Courier New"/>
               </a:rPr>
-              <a:t># Extension インストール</a:t>
+              <a:t># Step 1: GitHub からダウンロード</a:t>
             </a:r>
             <a:endParaRPr lang="en-US" sz="900" dirty="0"/>
           </a:p>
@@ -25264,7 +25320,7 @@
                 </a:solidFill>
                 <a:latin typeface="Courier New"/>
               </a:rPr>
-              <a:t>gemini extensions install \</a:t>
+              <a:t>github.com/CobaltSato/</a:t>
             </a:r>
             <a:endParaRPr lang="en-US" sz="900" dirty="0"/>
           </a:p>
@@ -25279,7 +25335,7 @@
                 </a:solidFill>
                 <a:latin typeface="Courier New"/>
               </a:rPr>
-              <a:t>  https://github.com/ankitchiplunkar/frontend-design</a:t>
+              <a:t>  react-grid-game-rendering-skill</a:t>
             </a:r>
             <a:endParaRPr lang="en-US" sz="900" dirty="0"/>
           </a:p>
@@ -25309,7 +25365,7 @@
                 </a:solidFill>
                 <a:latin typeface="Courier New"/>
               </a:rPr>
-              <a:t># スキル有効化</a:t>
+              <a:t># Step 2: スキルインストール</a:t>
             </a:r>
             <a:endParaRPr lang="en-US" sz="900" dirty="0"/>
           </a:p>
@@ -25324,7 +25380,37 @@
                 </a:solidFill>
                 <a:latin typeface="Courier New"/>
               </a:rPr>
-              <a:t>gemini skills enable frontend-design</a:t>
+              <a:t>gemini skills install \</a:t>
+            </a:r>
+            <a:endParaRPr lang="en-US" sz="900" dirty="0"/>
+          </a:p>
+          <a:p>
+            <a:pPr algn="l" indent="0" marL="0">
+              <a:buNone/>
+            </a:pPr>
+            <a:r>
+              <a:rPr lang="en-US" sz="900" dirty="0">
+                <a:solidFill>
+                  <a:srgbClr val="FFFFFF"/>
+                </a:solidFill>
+                <a:latin typeface="Courier New"/>
+              </a:rPr>
+              <a:t>  ./avax-like-frontend-design.skill \</a:t>
+            </a:r>
+            <a:endParaRPr lang="en-US" sz="900" dirty="0"/>
+          </a:p>
+          <a:p>
+            <a:pPr algn="l" indent="0" marL="0">
+              <a:buNone/>
+            </a:pPr>
+            <a:r>
+              <a:rPr lang="en-US" sz="900" dirty="0">
+                <a:solidFill>
+                  <a:srgbClr val="FFFFFF"/>
+                </a:solidFill>
+                <a:latin typeface="Courier New"/>
+              </a:rPr>
+              <a:t>  --scope workspace</a:t>
             </a:r>
             <a:endParaRPr lang="en-US" sz="900" dirty="0"/>
           </a:p>
@@ -25433,7 +25519,7 @@
                   <a:srgbClr val="FFFFFF"/>
                 </a:solidFill>
               </a:rPr>
-              <a:t>frontend-design スキルを使って、</a:t>
+              <a:t>avax-like-frontend-design スキルを使って、</a:t>
             </a:r>
             <a:endParaRPr lang="en-US" sz="900" dirty="0"/>
           </a:p>
@@ -28616,6 +28702,7 @@
                 <a:solidFill>
                   <a:srgbClr val="16A085"/>
                 </a:solidFill>
+                <a:hlinkClick r:id="rId3"/>
               </a:rPr>
               <a:t>🔗 https://github.com/CobaltSato/avalanche-build-games-tool-kit</a:t>
             </a:r>

</xml_diff>